<commit_message>
Updated the list of improvements for the next phase in the presentation
</commit_message>
<xml_diff>
--- a/Crazy Putting Presentation.pptx
+++ b/Crazy Putting Presentation.pptx
@@ -6666,12 +6666,80 @@
         </p:spPr>
         <p:txBody>
           <a:bodyPr>
-            <a:normAutofit/>
+            <a:normAutofit fontScale="62500" lnSpcReduction="20000"/>
           </a:bodyPr>
           <a:lstStyle/>
           <a:p>
             <a:r>
-              <a:rPr lang="en-US" sz="1800">
+              <a:rPr lang="en-US" sz="1800" dirty="0">
+                <a:solidFill>
+                  <a:srgbClr val="FFFFFF"/>
+                </a:solidFill>
+              </a:rPr>
+              <a:t>- Improved physics engine using the second-order </a:t>
+            </a:r>
+            <a:r>
+              <a:rPr lang="en-US" sz="1800" dirty="0" err="1">
+                <a:solidFill>
+                  <a:srgbClr val="FFFFFF"/>
+                </a:solidFill>
+              </a:rPr>
+              <a:t>Verlet</a:t>
+            </a:r>
+            <a:r>
+              <a:rPr lang="en-US" sz="1800" dirty="0">
+                <a:solidFill>
+                  <a:srgbClr val="FFFFFF"/>
+                </a:solidFill>
+              </a:rPr>
+              <a:t> solver and the classical 4</a:t>
+            </a:r>
+            <a:r>
+              <a:rPr lang="en-US" sz="1800" baseline="30000" dirty="0">
+                <a:solidFill>
+                  <a:srgbClr val="FFFFFF"/>
+                </a:solidFill>
+              </a:rPr>
+              <a:t>th</a:t>
+            </a:r>
+            <a:r>
+              <a:rPr lang="en-US" sz="1800" dirty="0">
+                <a:solidFill>
+                  <a:srgbClr val="FFFFFF"/>
+                </a:solidFill>
+              </a:rPr>
+              <a:t>-order Runge-</a:t>
+            </a:r>
+            <a:r>
+              <a:rPr lang="en-US" sz="1800" dirty="0" err="1">
+                <a:solidFill>
+                  <a:srgbClr val="FFFFFF"/>
+                </a:solidFill>
+              </a:rPr>
+              <a:t>Kutta</a:t>
+            </a:r>
+            <a:r>
+              <a:rPr lang="en-US" sz="1800" dirty="0">
+                <a:solidFill>
+                  <a:srgbClr val="FFFFFF"/>
+                </a:solidFill>
+              </a:rPr>
+              <a:t> solver</a:t>
+            </a:r>
+          </a:p>
+          <a:p>
+            <a:r>
+              <a:rPr lang="en-US" sz="1800" dirty="0">
+                <a:solidFill>
+                  <a:srgbClr val="FFFFFF"/>
+                </a:solidFill>
+              </a:rPr>
+              <a:t>- A bot that can consistently make a hole-in-one that has knowledge about the terrain</a:t>
+            </a:r>
+          </a:p>
+          <a:p>
+            <a:r>
+              <a:rPr lang="en-US" sz="1800" dirty="0">
                 <a:solidFill>
                   <a:srgbClr val="FFFFFF"/>
                 </a:solidFill>
@@ -6681,17 +6749,17 @@
           </a:p>
           <a:p>
             <a:r>
-              <a:rPr lang="en-US" sz="1800">
+              <a:rPr lang="en-US" sz="1800" dirty="0">
                 <a:solidFill>
                   <a:srgbClr val="FFFFFF"/>
                 </a:solidFill>
               </a:rPr>
-              <a:t>- More options for terrain obstacles</a:t>
-            </a:r>
-          </a:p>
-          <a:p>
-            <a:r>
-              <a:rPr lang="en-US" sz="1800">
+              <a:t>- More options for terrain obstacles (trees, sandbanks, improved water)</a:t>
+            </a:r>
+          </a:p>
+          <a:p>
+            <a:r>
+              <a:rPr lang="en-US" sz="1800" dirty="0">
                 <a:solidFill>
                   <a:srgbClr val="FFFFFF"/>
                 </a:solidFill>
@@ -6701,7 +6769,7 @@
           </a:p>
           <a:p>
             <a:r>
-              <a:rPr lang="en-US" sz="1800">
+              <a:rPr lang="en-US" sz="1800" dirty="0">
                 <a:solidFill>
                   <a:srgbClr val="FFFFFF"/>
                 </a:solidFill>
@@ -6711,7 +6779,7 @@
           </a:p>
           <a:p>
             <a:r>
-              <a:rPr lang="en-US" sz="1800">
+              <a:rPr lang="en-US" sz="1800" dirty="0">
                 <a:solidFill>
                   <a:srgbClr val="FFFFFF"/>
                 </a:solidFill>
@@ -6721,14 +6789,14 @@
           </a:p>
           <a:p>
             <a:r>
-              <a:rPr lang="en-US" sz="1800">
+              <a:rPr lang="en-US" sz="1800" dirty="0">
                 <a:solidFill>
                   <a:srgbClr val="FFFFFF"/>
                 </a:solidFill>
               </a:rPr>
               <a:t>- Scoring board</a:t>
             </a:r>
-            <a:endParaRPr lang="nl-NL" sz="1800">
+            <a:endParaRPr lang="nl-NL" sz="1800" dirty="0">
               <a:solidFill>
                 <a:srgbClr val="FFFFFF"/>
               </a:solidFill>

</xml_diff>

<commit_message>
Point of return (and hysterical depression)
</commit_message>
<xml_diff>
--- a/Crazy Putting Presentation.pptx
+++ b/Crazy Putting Presentation.pptx
@@ -5169,7 +5169,7 @@
       </p:grpSpPr>
       <p:sp>
         <p:nvSpPr>
-          <p:cNvPr id="47" name="Rectangle 46">
+          <p:cNvPr id="54" name="Rectangle 53">
             <a:extLst>
               <a:ext uri="{FF2B5EF4-FFF2-40B4-BE49-F238E27FC236}">
                 <a16:creationId xmlns:a16="http://schemas.microsoft.com/office/drawing/2014/main" id="{E844E128-FF69-4E9F-8327-6B504B3C5AE1}"/>
@@ -5240,8 +5240,8 @@
         </p:nvSpPr>
         <p:spPr>
           <a:xfrm>
-            <a:off x="643467" y="516835"/>
-            <a:ext cx="3448259" cy="1666501"/>
+            <a:off x="1097280" y="516835"/>
+            <a:ext cx="5977937" cy="1666501"/>
           </a:xfrm>
         </p:spPr>
         <p:txBody>
@@ -5263,7 +5263,7 @@
       </p:sp>
       <p:cxnSp>
         <p:nvCxnSpPr>
-          <p:cNvPr id="49" name="Straight Connector 48">
+          <p:cNvPr id="56" name="Straight Connector 55">
             <a:extLst>
               <a:ext uri="{FF2B5EF4-FFF2-40B4-BE49-F238E27FC236}">
                 <a16:creationId xmlns:a16="http://schemas.microsoft.com/office/drawing/2014/main" id="{055CEADF-09EA-423C-8C45-F94AF44D5AF0}"/>
@@ -5286,8 +5286,8 @@
         </p:nvCxnSpPr>
         <p:spPr>
           <a:xfrm>
-            <a:off x="723686" y="2353592"/>
-            <a:ext cx="3291840" cy="0"/>
+            <a:off x="1215896" y="2353592"/>
+            <a:ext cx="5303520" cy="0"/>
           </a:xfrm>
           <a:prstGeom prst="line">
             <a:avLst/>
@@ -5331,8 +5331,8 @@
         </p:nvSpPr>
         <p:spPr>
           <a:xfrm>
-            <a:off x="643467" y="2546224"/>
-            <a:ext cx="3448259" cy="3342747"/>
+            <a:off x="1097279" y="2546224"/>
+            <a:ext cx="5977938" cy="3342747"/>
           </a:xfrm>
         </p:spPr>
         <p:txBody>
@@ -5368,6 +5368,16 @@
                 </a:solidFill>
               </a:rPr>
               <a:t>- Shaders for coloring</a:t>
+            </a:r>
+          </a:p>
+          <a:p>
+            <a:r>
+              <a:rPr lang="en-US" sz="1800" dirty="0">
+                <a:solidFill>
+                  <a:srgbClr val="FFFFFF"/>
+                </a:solidFill>
+              </a:rPr>
+              <a:t>- 3D objects for ball and goal</a:t>
             </a:r>
           </a:p>
           <a:p>
@@ -5404,13 +5414,48 @@
               </a:ext>
             </a:extLst>
           </a:blip>
-          <a:srcRect l="18586" r="19589"/>
+          <a:srcRect l="11424" r="12429" b="1"/>
           <a:stretch/>
         </p:blipFill>
         <p:spPr>
           <a:xfrm>
-            <a:off x="4654296" y="10"/>
-            <a:ext cx="7537703" cy="6857990"/>
+            <a:off x="7611900" y="-10230"/>
+            <a:ext cx="4580098" cy="3383279"/>
+          </a:xfrm>
+          <a:prstGeom prst="rect">
+            <a:avLst/>
+          </a:prstGeom>
+        </p:spPr>
+      </p:pic>
+      <p:pic>
+        <p:nvPicPr>
+          <p:cNvPr id="4" name="Picture 3" descr="A picture containing computer, laptop&#10;&#10;Description automatically generated">
+            <a:extLst>
+              <a:ext uri="{FF2B5EF4-FFF2-40B4-BE49-F238E27FC236}">
+                <a16:creationId xmlns:a16="http://schemas.microsoft.com/office/drawing/2014/main" id="{526ECB9D-3D60-43AA-9E18-78966781DE48}"/>
+              </a:ext>
+            </a:extLst>
+          </p:cNvPr>
+          <p:cNvPicPr>
+            <a:picLocks noChangeAspect="1"/>
+          </p:cNvPicPr>
+          <p:nvPr/>
+        </p:nvPicPr>
+        <p:blipFill rotWithShape="1">
+          <a:blip r:embed="rId4">
+            <a:extLst>
+              <a:ext uri="{28A0092B-C50C-407E-A947-70E740481C1C}">
+                <a14:useLocalDpi xmlns:a14="http://schemas.microsoft.com/office/drawing/2010/main" val="0"/>
+              </a:ext>
+            </a:extLst>
+          </a:blip>
+          <a:srcRect t="1508" r="-2" b="-2"/>
+          <a:stretch/>
+        </p:blipFill>
+        <p:spPr>
+          <a:xfrm>
+            <a:off x="7611904" y="3474718"/>
+            <a:ext cx="4580097" cy="3383280"/>
           </a:xfrm>
           <a:prstGeom prst="rect">
             <a:avLst/>
@@ -6290,28 +6335,47 @@
           <a:lstStyle/>
           <a:p>
             <a:r>
-              <a:rPr lang="en-US"/>
+              <a:rPr lang="en-US" dirty="0"/>
               <a:t>- Teamwork</a:t>
             </a:r>
           </a:p>
           <a:p>
             <a:r>
-              <a:rPr lang="en-US"/>
+              <a:rPr lang="en-US" dirty="0"/>
               <a:t>- Setting up project structure</a:t>
             </a:r>
           </a:p>
           <a:p>
             <a:r>
-              <a:rPr lang="en-US"/>
+              <a:rPr lang="en-US" dirty="0"/>
               <a:t>- Separate projects</a:t>
             </a:r>
           </a:p>
           <a:p>
             <a:r>
-              <a:rPr lang="en-US"/>
-              <a:t>- LibGdx</a:t>
+              <a:rPr lang="en-US" dirty="0"/>
+              <a:t>- </a:t>
+            </a:r>
+            <a:r>
+              <a:rPr lang="en-US" dirty="0" err="1"/>
+              <a:t>LibGdx</a:t>
             </a:r>
             <a:endParaRPr lang="nl-NL" dirty="0"/>
+          </a:p>
+          <a:p>
+            <a:r>
+              <a:rPr lang="nl-NL" dirty="0"/>
+              <a:t>- General </a:t>
+            </a:r>
+            <a:r>
+              <a:rPr lang="nl-NL" dirty="0" err="1"/>
+              <a:t>lack</a:t>
+            </a:r>
+            <a:r>
+              <a:rPr lang="nl-NL" dirty="0"/>
+              <a:t> of time</a:t>
+            </a:r>
+            <a:endParaRPr lang="en-US" dirty="0"/>
           </a:p>
         </p:txBody>
       </p:sp>
@@ -6575,14 +6639,14 @@
           <a:lstStyle/>
           <a:p>
             <a:r>
-              <a:rPr lang="en-US" sz="3700">
+              <a:rPr lang="en-US" sz="3700" dirty="0">
                 <a:solidFill>
                   <a:srgbClr val="FFFFFF"/>
                 </a:solidFill>
               </a:rPr>
-              <a:t>Improvements</a:t>
-            </a:r>
-            <a:endParaRPr lang="nl-NL" sz="3700">
+              <a:t>Improvements and features for phase 2</a:t>
+            </a:r>
+            <a:endParaRPr lang="nl-NL" sz="3700" dirty="0">
               <a:solidFill>
                 <a:srgbClr val="FFFFFF"/>
               </a:solidFill>
@@ -6661,7 +6725,7 @@
         <p:spPr>
           <a:xfrm>
             <a:off x="643467" y="2546224"/>
-            <a:ext cx="3448259" cy="3342747"/>
+            <a:ext cx="3448259" cy="4144716"/>
           </a:xfrm>
         </p:spPr>
         <p:txBody>
@@ -6676,6 +6740,44 @@
                   <a:srgbClr val="FFFFFF"/>
                 </a:solidFill>
               </a:rPr>
+              <a:t>- Re-do </a:t>
+            </a:r>
+            <a:r>
+              <a:rPr lang="en-US" sz="1800">
+                <a:solidFill>
+                  <a:srgbClr val="FFFFFF"/>
+                </a:solidFill>
+              </a:rPr>
+              <a:t>project structure</a:t>
+            </a:r>
+          </a:p>
+          <a:p>
+            <a:r>
+              <a:rPr lang="en-US" sz="1800" dirty="0">
+                <a:solidFill>
+                  <a:srgbClr val="FFFFFF"/>
+                </a:solidFill>
+              </a:rPr>
+              <a:t>- Finish the connection between the UI and the back-end</a:t>
+            </a:r>
+          </a:p>
+          <a:p>
+            <a:r>
+              <a:rPr lang="en-US" sz="1800" dirty="0">
+                <a:solidFill>
+                  <a:srgbClr val="FFFFFF"/>
+                </a:solidFill>
+              </a:rPr>
+              <a:t>- Refactor the code to make it easier to expand on it</a:t>
+            </a:r>
+          </a:p>
+          <a:p>
+            <a:r>
+              <a:rPr lang="en-US" sz="1800" dirty="0">
+                <a:solidFill>
+                  <a:srgbClr val="FFFFFF"/>
+                </a:solidFill>
+              </a:rPr>
               <a:t>- Improved physics engine using the second-order </a:t>
             </a:r>
             <a:r>
@@ -6774,7 +6876,7 @@
                   <a:srgbClr val="FFFFFF"/>
                 </a:solidFill>
               </a:rPr>
-              <a:t>- Improved 3D UI</a:t>
+              <a:t>- Improved/expanded 3D UI (show a preview of the ball reset when hitting water and the direction that you’re shooting the ball in)</a:t>
             </a:r>
           </a:p>
           <a:p>
@@ -6786,21 +6888,6 @@
               </a:rPr>
               <a:t>- Music</a:t>
             </a:r>
-          </a:p>
-          <a:p>
-            <a:r>
-              <a:rPr lang="en-US" sz="1800" dirty="0">
-                <a:solidFill>
-                  <a:srgbClr val="FFFFFF"/>
-                </a:solidFill>
-              </a:rPr>
-              <a:t>- Scoring board</a:t>
-            </a:r>
-            <a:endParaRPr lang="nl-NL" sz="1800" dirty="0">
-              <a:solidFill>
-                <a:srgbClr val="FFFFFF"/>
-              </a:solidFill>
-            </a:endParaRPr>
           </a:p>
         </p:txBody>
       </p:sp>

</xml_diff>